<commit_message>
update github link in the pp
</commit_message>
<xml_diff>
--- a/PwC/MinhTran_PwC_task2.pptx
+++ b/PwC/MinhTran_PwC_task2.pptx
@@ -4666,7 +4666,24 @@
                   <a:srgbClr val="404040"/>
                 </a:solidFill>
               </a:rPr>
-              <a:t>More details on dataset and analysis development can be find here:</a:t>
+              <a:t>More details on dataset and analysis development can be find here: </a:t>
+            </a:r>
+            <a:r>
+              <a:rPr lang="en-US" sz="2800" i="1" dirty="0">
+                <a:solidFill>
+                  <a:srgbClr val="404040"/>
+                </a:solidFill>
+                <a:hlinkClick r:id="rId2"/>
+              </a:rPr>
+              <a:t>https://github.com/minhtran384/data-science/tree/master/PwC</a:t>
+            </a:r>
+            <a:r>
+              <a:rPr lang="en-US" sz="2800" i="1" dirty="0">
+                <a:solidFill>
+                  <a:srgbClr val="404040"/>
+                </a:solidFill>
+              </a:rPr>
+              <a:t> </a:t>
             </a:r>
           </a:p>
           <a:p>

</xml_diff>